<commit_message>
Minor revision to presentation
</commit_message>
<xml_diff>
--- a/pres/6306_CaseStudy_1_Slides.pptx
+++ b/pres/6306_CaseStudy_1_Slides.pptx
@@ -121,6 +121,9 @@
     <p:ext uri="{EFAFB233-063F-42B5-8137-9DF3F51BA10A}">
       <p15:sldGuideLst xmlns:p15="http://schemas.microsoft.com/office/powerpoint/2012/main"/>
     </p:ext>
+    <p:ext uri="{2D200454-40CA-4A62-9FC3-DE9A4176ACB9}">
+      <p15:notesGuideLst xmlns:p15="http://schemas.microsoft.com/office/powerpoint/2012/main"/>
+    </p:ext>
   </p:extLst>
 </p:presentation>
 </file>
@@ -207,7 +210,7 @@
           <a:p>
             <a:fld id="{7B08E896-7BC2-4801-9EF8-13EE80B0F038}" type="datetimeFigureOut">
               <a:rPr lang="en-US" smtClean="0"/>
-              <a:t>10/17/2018</a:t>
+              <a:t>10/18/2018</a:t>
             </a:fld>
             <a:endParaRPr lang="en-US"/>
           </a:p>
@@ -829,7 +832,7 @@
             <a:fld id="{B61BEF0D-F0BB-DE4B-95CE-6DB70DBA9567}" type="datetimeFigureOut">
               <a:rPr lang="en-US" smtClean="0"/>
               <a:pPr/>
-              <a:t>10/17/2018</a:t>
+              <a:t>10/18/2018</a:t>
             </a:fld>
             <a:endParaRPr lang="en-US" dirty="0"/>
           </a:p>
@@ -1093,7 +1096,7 @@
             <a:fld id="{B61BEF0D-F0BB-DE4B-95CE-6DB70DBA9567}" type="datetimeFigureOut">
               <a:rPr lang="en-US" smtClean="0"/>
               <a:pPr/>
-              <a:t>10/17/2018</a:t>
+              <a:t>10/18/2018</a:t>
             </a:fld>
             <a:endParaRPr lang="en-US" dirty="0"/>
           </a:p>
@@ -1330,7 +1333,7 @@
             <a:fld id="{B61BEF0D-F0BB-DE4B-95CE-6DB70DBA9567}" type="datetimeFigureOut">
               <a:rPr lang="en-US" smtClean="0"/>
               <a:pPr/>
-              <a:t>10/17/2018</a:t>
+              <a:t>10/18/2018</a:t>
             </a:fld>
             <a:endParaRPr lang="en-US" dirty="0"/>
           </a:p>
@@ -1572,7 +1575,7 @@
             <a:fld id="{B61BEF0D-F0BB-DE4B-95CE-6DB70DBA9567}" type="datetimeFigureOut">
               <a:rPr lang="en-US" smtClean="0"/>
               <a:pPr/>
-              <a:t>10/17/2018</a:t>
+              <a:t>10/18/2018</a:t>
             </a:fld>
             <a:endParaRPr lang="en-US" dirty="0"/>
           </a:p>
@@ -1881,7 +1884,7 @@
             <a:fld id="{B61BEF0D-F0BB-DE4B-95CE-6DB70DBA9567}" type="datetimeFigureOut">
               <a:rPr lang="en-US" smtClean="0"/>
               <a:pPr/>
-              <a:t>10/17/2018</a:t>
+              <a:t>10/18/2018</a:t>
             </a:fld>
             <a:endParaRPr lang="en-US" dirty="0"/>
           </a:p>
@@ -2185,7 +2188,7 @@
             <a:fld id="{B61BEF0D-F0BB-DE4B-95CE-6DB70DBA9567}" type="datetimeFigureOut">
               <a:rPr lang="en-US" smtClean="0"/>
               <a:pPr/>
-              <a:t>10/17/2018</a:t>
+              <a:t>10/18/2018</a:t>
             </a:fld>
             <a:endParaRPr lang="en-US" dirty="0"/>
           </a:p>
@@ -2609,7 +2612,7 @@
             <a:fld id="{B61BEF0D-F0BB-DE4B-95CE-6DB70DBA9567}" type="datetimeFigureOut">
               <a:rPr lang="en-US" smtClean="0"/>
               <a:pPr/>
-              <a:t>10/17/2018</a:t>
+              <a:t>10/18/2018</a:t>
             </a:fld>
             <a:endParaRPr lang="en-US" dirty="0"/>
           </a:p>
@@ -2773,7 +2776,7 @@
             <a:fld id="{B61BEF0D-F0BB-DE4B-95CE-6DB70DBA9567}" type="datetimeFigureOut">
               <a:rPr lang="en-US" smtClean="0"/>
               <a:pPr/>
-              <a:t>10/17/2018</a:t>
+              <a:t>10/18/2018</a:t>
             </a:fld>
             <a:endParaRPr lang="en-US" dirty="0"/>
           </a:p>
@@ -2870,7 +2873,7 @@
             <a:fld id="{B61BEF0D-F0BB-DE4B-95CE-6DB70DBA9567}" type="datetimeFigureOut">
               <a:rPr lang="en-US" smtClean="0"/>
               <a:pPr/>
-              <a:t>10/17/2018</a:t>
+              <a:t>10/18/2018</a:t>
             </a:fld>
             <a:endParaRPr lang="en-US" dirty="0"/>
           </a:p>
@@ -3250,7 +3253,7 @@
             <a:fld id="{B61BEF0D-F0BB-DE4B-95CE-6DB70DBA9567}" type="datetimeFigureOut">
               <a:rPr lang="en-US" smtClean="0"/>
               <a:pPr/>
-              <a:t>10/17/2018</a:t>
+              <a:t>10/18/2018</a:t>
             </a:fld>
             <a:endParaRPr lang="en-US" dirty="0"/>
           </a:p>
@@ -3541,7 +3544,7 @@
             <a:fld id="{B61BEF0D-F0BB-DE4B-95CE-6DB70DBA9567}" type="datetimeFigureOut">
               <a:rPr lang="en-US" smtClean="0"/>
               <a:pPr/>
-              <a:t>10/17/2018</a:t>
+              <a:t>10/18/2018</a:t>
             </a:fld>
             <a:endParaRPr lang="en-US" dirty="0"/>
           </a:p>
@@ -3754,7 +3757,7 @@
             <a:fld id="{B61BEF0D-F0BB-DE4B-95CE-6DB70DBA9567}" type="datetimeFigureOut">
               <a:rPr lang="en-US" smtClean="0"/>
               <a:pPr/>
-              <a:t>10/17/2018</a:t>
+              <a:t>10/18/2018</a:t>
             </a:fld>
             <a:endParaRPr lang="en-US" dirty="0"/>
           </a:p>
@@ -4511,13 +4514,8 @@
             </a:r>
             <a:r>
               <a:rPr lang="en-US" dirty="0" smtClean="0"/>
-              <a:t>10</a:t>
-            </a:r>
-            <a:r>
-              <a:rPr lang="en-US" dirty="0" smtClean="0"/>
-              <a:t>%.</a:t>
-            </a:r>
-            <a:endParaRPr lang="en-US" dirty="0" smtClean="0"/>
+              <a:t>10%.</a:t>
+            </a:r>
           </a:p>
         </p:txBody>
       </p:sp>
@@ -4640,7 +4638,18 @@
             </a:r>
             <a:r>
               <a:rPr lang="en-US" dirty="0" smtClean="0"/>
-              <a:t>--- Colorado </a:t>
+              <a:t>--- </a:t>
+            </a:r>
+            <a:endParaRPr lang="en-US" dirty="0" smtClean="0"/>
+          </a:p>
+          <a:p>
+            <a:pPr lvl="1">
+              <a:buFont typeface="Wingdings" panose="05000000000000000000" pitchFamily="2" charset="2"/>
+              <a:buChar char="ü"/>
+            </a:pPr>
+            <a:r>
+              <a:rPr lang="en-US" dirty="0" smtClean="0"/>
+              <a:t>Colorado </a:t>
             </a:r>
             <a:r>
               <a:rPr lang="en-US" dirty="0"/>
@@ -4658,7 +4667,11 @@
             </a:pPr>
             <a:r>
               <a:rPr lang="en-US" dirty="0" smtClean="0"/>
-              <a:t>Have </a:t>
+              <a:t>With</a:t>
+            </a:r>
+            <a:r>
+              <a:rPr lang="en-US" dirty="0" smtClean="0"/>
+              <a:t> </a:t>
             </a:r>
             <a:r>
               <a:rPr lang="en-US" dirty="0"/>
@@ -4666,7 +4679,18 @@
             </a:r>
             <a:r>
               <a:rPr lang="en-US" dirty="0" smtClean="0"/>
-              <a:t>--- South </a:t>
+              <a:t>--- </a:t>
+            </a:r>
+            <a:endParaRPr lang="en-US" dirty="0" smtClean="0"/>
+          </a:p>
+          <a:p>
+            <a:pPr lvl="1">
+              <a:buFont typeface="Wingdings" panose="05000000000000000000" pitchFamily="2" charset="2"/>
+              <a:buChar char="ü"/>
+            </a:pPr>
+            <a:r>
+              <a:rPr lang="en-US" dirty="0" smtClean="0"/>
+              <a:t>South </a:t>
             </a:r>
             <a:r>
               <a:rPr lang="en-US" dirty="0"/>
@@ -4682,16 +4706,9 @@
             </a:r>
             <a:r>
               <a:rPr lang="en-US" dirty="0" smtClean="0"/>
-              <a:t>], </a:t>
-            </a:r>
-            <a:r>
-              <a:rPr lang="en-US" dirty="0"/>
-              <a:t>which gives an opportunity to grow those </a:t>
-            </a:r>
-            <a:r>
-              <a:rPr lang="en-US" dirty="0" smtClean="0"/>
-              <a:t>markets; and/or,</a:t>
-            </a:r>
+              <a:t>]</a:t>
+            </a:r>
+            <a:endParaRPr lang="en-US" dirty="0" smtClean="0"/>
           </a:p>
           <a:p>
             <a:pPr>
@@ -4700,15 +4717,30 @@
             </a:pPr>
             <a:r>
               <a:rPr lang="en-US" dirty="0" smtClean="0"/>
-              <a:t>Have </a:t>
+              <a:t>With </a:t>
+            </a:r>
+            <a:r>
+              <a:rPr lang="en-US" dirty="0" smtClean="0"/>
+              <a:t>the </a:t>
             </a:r>
             <a:r>
               <a:rPr lang="en-US" dirty="0"/>
-              <a:t>the highest median IBU </a:t>
+              <a:t>highest median IBU </a:t>
             </a:r>
             <a:r>
               <a:rPr lang="en-US" dirty="0" smtClean="0"/>
-              <a:t>--- Maine </a:t>
+              <a:t>--- </a:t>
+            </a:r>
+            <a:endParaRPr lang="en-US" dirty="0" smtClean="0"/>
+          </a:p>
+          <a:p>
+            <a:pPr lvl="1">
+              <a:buFont typeface="Wingdings" panose="05000000000000000000" pitchFamily="2" charset="2"/>
+              <a:buChar char="ü"/>
+            </a:pPr>
+            <a:r>
+              <a:rPr lang="en-US" dirty="0" smtClean="0"/>
+              <a:t>Maine </a:t>
             </a:r>
             <a:r>
               <a:rPr lang="en-US" dirty="0"/>
@@ -4716,20 +4748,13 @@
             </a:r>
             <a:r>
               <a:rPr lang="en-US" dirty="0" smtClean="0"/>
-              <a:t>52] to </a:t>
-            </a:r>
-            <a:r>
-              <a:rPr lang="en-US" dirty="0"/>
-              <a:t>bring beer that </a:t>
+              <a:t>52</a:t>
             </a:r>
             <a:r>
               <a:rPr lang="en-US" dirty="0" smtClean="0"/>
-              <a:t>have </a:t>
-            </a:r>
-            <a:r>
-              <a:rPr lang="en-US" dirty="0"/>
-              <a:t>similar style/ABV to the local beers but with a lower IBU (tastes less bitter) in order to gain market share.</a:t>
-            </a:r>
+              <a:t>]</a:t>
+            </a:r>
+            <a:endParaRPr lang="en-US" dirty="0"/>
           </a:p>
           <a:p>
             <a:endParaRPr lang="en-US" dirty="0" smtClean="0"/>

</xml_diff>

<commit_message>
Revision to MLT's presentation
</commit_message>
<xml_diff>
--- a/pres/6306_CaseStudy_1_Slides.pptx
+++ b/pres/6306_CaseStudy_1_Slides.pptx
@@ -524,6 +524,110 @@
           <a:p>
             <a:r>
               <a:rPr lang="en-US" dirty="0" smtClean="0"/>
+              <a:t>Good</a:t>
+            </a:r>
+            <a:r>
+              <a:rPr lang="en-US" baseline="0" dirty="0" smtClean="0"/>
+              <a:t> Morning</a:t>
+            </a:r>
+          </a:p>
+          <a:p>
+            <a:r>
+              <a:rPr lang="en-US" baseline="0" dirty="0" smtClean="0"/>
+              <a:t>Thank you for joining us today</a:t>
+            </a:r>
+          </a:p>
+          <a:p>
+            <a:r>
+              <a:rPr lang="en-US" baseline="0" dirty="0" smtClean="0"/>
+              <a:t>We’re excited to share with you the results of our analysis of the domestic beers and breweries</a:t>
+            </a:r>
+            <a:endParaRPr lang="en-US" dirty="0"/>
+          </a:p>
+        </p:txBody>
+      </p:sp>
+      <p:sp>
+        <p:nvSpPr>
+          <p:cNvPr id="4" name="Slide Number Placeholder 3"/>
+          <p:cNvSpPr>
+            <a:spLocks noGrp="1"/>
+          </p:cNvSpPr>
+          <p:nvPr>
+            <p:ph type="sldNum" sz="quarter" idx="10"/>
+          </p:nvPr>
+        </p:nvSpPr>
+        <p:spPr/>
+        <p:txBody>
+          <a:bodyPr/>
+          <a:lstStyle/>
+          <a:p>
+            <a:fld id="{1CD20D18-C2BB-4D17-BF0D-F161849BA92D}" type="slidenum">
+              <a:rPr lang="en-US" smtClean="0"/>
+              <a:t>1</a:t>
+            </a:fld>
+            <a:endParaRPr lang="en-US"/>
+          </a:p>
+        </p:txBody>
+      </p:sp>
+    </p:spTree>
+    <p:extLst>
+      <p:ext uri="{BB962C8B-B14F-4D97-AF65-F5344CB8AC3E}">
+        <p14:creationId xmlns:p14="http://schemas.microsoft.com/office/powerpoint/2010/main" val="3979927918"/>
+      </p:ext>
+    </p:extLst>
+  </p:cSld>
+  <p:clrMapOvr>
+    <a:masterClrMapping/>
+  </p:clrMapOvr>
+</p:notes>
+</file>
+
+<file path=ppt/notesSlides/notesSlide10.xml><?xml version="1.0" encoding="utf-8"?>
+<p:notes xmlns:a="http://schemas.openxmlformats.org/drawingml/2006/main" xmlns:r="http://schemas.openxmlformats.org/officeDocument/2006/relationships" xmlns:p="http://schemas.openxmlformats.org/presentationml/2006/main">
+  <p:cSld>
+    <p:spTree>
+      <p:nvGrpSpPr>
+        <p:cNvPr id="1" name=""/>
+        <p:cNvGrpSpPr/>
+        <p:nvPr/>
+      </p:nvGrpSpPr>
+      <p:grpSpPr>
+        <a:xfrm>
+          <a:off x="0" y="0"/>
+          <a:ext cx="0" cy="0"/>
+          <a:chOff x="0" y="0"/>
+          <a:chExt cx="0" cy="0"/>
+        </a:xfrm>
+      </p:grpSpPr>
+      <p:sp>
+        <p:nvSpPr>
+          <p:cNvPr id="2" name="Slide Image Placeholder 1"/>
+          <p:cNvSpPr>
+            <a:spLocks noGrp="1" noRot="1" noChangeAspect="1"/>
+          </p:cNvSpPr>
+          <p:nvPr>
+            <p:ph type="sldImg"/>
+          </p:nvPr>
+        </p:nvSpPr>
+        <p:spPr/>
+      </p:sp>
+      <p:sp>
+        <p:nvSpPr>
+          <p:cNvPr id="3" name="Notes Placeholder 2"/>
+          <p:cNvSpPr>
+            <a:spLocks noGrp="1"/>
+          </p:cNvSpPr>
+          <p:nvPr>
+            <p:ph type="body" idx="1"/>
+          </p:nvPr>
+        </p:nvSpPr>
+        <p:spPr/>
+        <p:txBody>
+          <a:bodyPr/>
+          <a:lstStyle/>
+          <a:p>
+            <a:r>
+              <a:rPr lang="en-US" dirty="0" smtClean="0"/>
               <a:t>The black dotted line is the mean ABV at that value of IBU. </a:t>
             </a:r>
           </a:p>
@@ -577,6 +681,775 @@
     <p:extLst>
       <p:ext uri="{BB962C8B-B14F-4D97-AF65-F5344CB8AC3E}">
         <p14:creationId xmlns:p14="http://schemas.microsoft.com/office/powerpoint/2010/main" val="3852113163"/>
+      </p:ext>
+    </p:extLst>
+  </p:cSld>
+  <p:clrMapOvr>
+    <a:masterClrMapping/>
+  </p:clrMapOvr>
+</p:notes>
+</file>
+
+<file path=ppt/notesSlides/notesSlide2.xml><?xml version="1.0" encoding="utf-8"?>
+<p:notes xmlns:a="http://schemas.openxmlformats.org/drawingml/2006/main" xmlns:r="http://schemas.openxmlformats.org/officeDocument/2006/relationships" xmlns:p="http://schemas.openxmlformats.org/presentationml/2006/main">
+  <p:cSld>
+    <p:spTree>
+      <p:nvGrpSpPr>
+        <p:cNvPr id="1" name=""/>
+        <p:cNvGrpSpPr/>
+        <p:nvPr/>
+      </p:nvGrpSpPr>
+      <p:grpSpPr>
+        <a:xfrm>
+          <a:off x="0" y="0"/>
+          <a:ext cx="0" cy="0"/>
+          <a:chOff x="0" y="0"/>
+          <a:chExt cx="0" cy="0"/>
+        </a:xfrm>
+      </p:grpSpPr>
+      <p:sp>
+        <p:nvSpPr>
+          <p:cNvPr id="2" name="Slide Image Placeholder 1"/>
+          <p:cNvSpPr>
+            <a:spLocks noGrp="1" noRot="1" noChangeAspect="1"/>
+          </p:cNvSpPr>
+          <p:nvPr>
+            <p:ph type="sldImg"/>
+          </p:nvPr>
+        </p:nvSpPr>
+        <p:spPr/>
+      </p:sp>
+      <p:sp>
+        <p:nvSpPr>
+          <p:cNvPr id="3" name="Notes Placeholder 2"/>
+          <p:cNvSpPr>
+            <a:spLocks noGrp="1"/>
+          </p:cNvSpPr>
+          <p:nvPr>
+            <p:ph type="body" idx="1"/>
+          </p:nvPr>
+        </p:nvSpPr>
+        <p:spPr/>
+        <p:txBody>
+          <a:bodyPr/>
+          <a:lstStyle/>
+          <a:p>
+            <a:endParaRPr lang="en-US" dirty="0"/>
+          </a:p>
+        </p:txBody>
+      </p:sp>
+      <p:sp>
+        <p:nvSpPr>
+          <p:cNvPr id="4" name="Slide Number Placeholder 3"/>
+          <p:cNvSpPr>
+            <a:spLocks noGrp="1"/>
+          </p:cNvSpPr>
+          <p:nvPr>
+            <p:ph type="sldNum" sz="quarter" idx="10"/>
+          </p:nvPr>
+        </p:nvSpPr>
+        <p:spPr/>
+        <p:txBody>
+          <a:bodyPr/>
+          <a:lstStyle/>
+          <a:p>
+            <a:fld id="{1CD20D18-C2BB-4D17-BF0D-F161849BA92D}" type="slidenum">
+              <a:rPr lang="en-US" smtClean="0"/>
+              <a:t>2</a:t>
+            </a:fld>
+            <a:endParaRPr lang="en-US"/>
+          </a:p>
+        </p:txBody>
+      </p:sp>
+    </p:spTree>
+    <p:extLst>
+      <p:ext uri="{BB962C8B-B14F-4D97-AF65-F5344CB8AC3E}">
+        <p14:creationId xmlns:p14="http://schemas.microsoft.com/office/powerpoint/2010/main" val="366591838"/>
+      </p:ext>
+    </p:extLst>
+  </p:cSld>
+  <p:clrMapOvr>
+    <a:masterClrMapping/>
+  </p:clrMapOvr>
+</p:notes>
+</file>
+
+<file path=ppt/notesSlides/notesSlide3.xml><?xml version="1.0" encoding="utf-8"?>
+<p:notes xmlns:a="http://schemas.openxmlformats.org/drawingml/2006/main" xmlns:r="http://schemas.openxmlformats.org/officeDocument/2006/relationships" xmlns:p="http://schemas.openxmlformats.org/presentationml/2006/main">
+  <p:cSld>
+    <p:spTree>
+      <p:nvGrpSpPr>
+        <p:cNvPr id="1" name=""/>
+        <p:cNvGrpSpPr/>
+        <p:nvPr/>
+      </p:nvGrpSpPr>
+      <p:grpSpPr>
+        <a:xfrm>
+          <a:off x="0" y="0"/>
+          <a:ext cx="0" cy="0"/>
+          <a:chOff x="0" y="0"/>
+          <a:chExt cx="0" cy="0"/>
+        </a:xfrm>
+      </p:grpSpPr>
+      <p:sp>
+        <p:nvSpPr>
+          <p:cNvPr id="2" name="Slide Image Placeholder 1"/>
+          <p:cNvSpPr>
+            <a:spLocks noGrp="1" noRot="1" noChangeAspect="1"/>
+          </p:cNvSpPr>
+          <p:nvPr>
+            <p:ph type="sldImg"/>
+          </p:nvPr>
+        </p:nvSpPr>
+        <p:spPr/>
+      </p:sp>
+      <p:sp>
+        <p:nvSpPr>
+          <p:cNvPr id="3" name="Notes Placeholder 2"/>
+          <p:cNvSpPr>
+            <a:spLocks noGrp="1"/>
+          </p:cNvSpPr>
+          <p:nvPr>
+            <p:ph type="body" idx="1"/>
+          </p:nvPr>
+        </p:nvSpPr>
+        <p:spPr/>
+        <p:txBody>
+          <a:bodyPr/>
+          <a:lstStyle/>
+          <a:p>
+            <a:r>
+              <a:rPr lang="en-US" dirty="0" smtClean="0"/>
+              <a:t>Our methodology</a:t>
+            </a:r>
+            <a:r>
+              <a:rPr lang="en-US" baseline="0" dirty="0" smtClean="0"/>
+              <a:t> is to perform an exploratory data analysis of the collected data</a:t>
+            </a:r>
+          </a:p>
+          <a:p>
+            <a:r>
+              <a:rPr lang="en-US" baseline="0" dirty="0" smtClean="0"/>
+              <a:t>That is we wrangled with the data by quantifying, merging, plotting it to identify and determine relationships for insights </a:t>
+            </a:r>
+            <a:endParaRPr lang="en-US" dirty="0"/>
+          </a:p>
+        </p:txBody>
+      </p:sp>
+      <p:sp>
+        <p:nvSpPr>
+          <p:cNvPr id="4" name="Slide Number Placeholder 3"/>
+          <p:cNvSpPr>
+            <a:spLocks noGrp="1"/>
+          </p:cNvSpPr>
+          <p:nvPr>
+            <p:ph type="sldNum" sz="quarter" idx="10"/>
+          </p:nvPr>
+        </p:nvSpPr>
+        <p:spPr/>
+        <p:txBody>
+          <a:bodyPr/>
+          <a:lstStyle/>
+          <a:p>
+            <a:fld id="{1CD20D18-C2BB-4D17-BF0D-F161849BA92D}" type="slidenum">
+              <a:rPr lang="en-US" smtClean="0"/>
+              <a:t>3</a:t>
+            </a:fld>
+            <a:endParaRPr lang="en-US"/>
+          </a:p>
+        </p:txBody>
+      </p:sp>
+    </p:spTree>
+    <p:extLst>
+      <p:ext uri="{BB962C8B-B14F-4D97-AF65-F5344CB8AC3E}">
+        <p14:creationId xmlns:p14="http://schemas.microsoft.com/office/powerpoint/2010/main" val="2704143008"/>
+      </p:ext>
+    </p:extLst>
+  </p:cSld>
+  <p:clrMapOvr>
+    <a:masterClrMapping/>
+  </p:clrMapOvr>
+</p:notes>
+</file>
+
+<file path=ppt/notesSlides/notesSlide4.xml><?xml version="1.0" encoding="utf-8"?>
+<p:notes xmlns:a="http://schemas.openxmlformats.org/drawingml/2006/main" xmlns:r="http://schemas.openxmlformats.org/officeDocument/2006/relationships" xmlns:p="http://schemas.openxmlformats.org/presentationml/2006/main">
+  <p:cSld>
+    <p:spTree>
+      <p:nvGrpSpPr>
+        <p:cNvPr id="1" name=""/>
+        <p:cNvGrpSpPr/>
+        <p:nvPr/>
+      </p:nvGrpSpPr>
+      <p:grpSpPr>
+        <a:xfrm>
+          <a:off x="0" y="0"/>
+          <a:ext cx="0" cy="0"/>
+          <a:chOff x="0" y="0"/>
+          <a:chExt cx="0" cy="0"/>
+        </a:xfrm>
+      </p:grpSpPr>
+      <p:sp>
+        <p:nvSpPr>
+          <p:cNvPr id="2" name="Slide Image Placeholder 1"/>
+          <p:cNvSpPr>
+            <a:spLocks noGrp="1" noRot="1" noChangeAspect="1"/>
+          </p:cNvSpPr>
+          <p:nvPr>
+            <p:ph type="sldImg"/>
+          </p:nvPr>
+        </p:nvSpPr>
+        <p:spPr/>
+      </p:sp>
+      <p:sp>
+        <p:nvSpPr>
+          <p:cNvPr id="3" name="Notes Placeholder 2"/>
+          <p:cNvSpPr>
+            <a:spLocks noGrp="1"/>
+          </p:cNvSpPr>
+          <p:nvPr>
+            <p:ph type="body" idx="1"/>
+          </p:nvPr>
+        </p:nvSpPr>
+        <p:spPr/>
+        <p:txBody>
+          <a:bodyPr/>
+          <a:lstStyle/>
+          <a:p>
+            <a:r>
+              <a:rPr lang="en-US" dirty="0" smtClean="0"/>
+              <a:t>By</a:t>
+            </a:r>
+            <a:r>
+              <a:rPr lang="en-US" baseline="0" dirty="0" smtClean="0"/>
+              <a:t> quantifying the number of breweries in each state, we learned where the breweries were concentrated.</a:t>
+            </a:r>
+          </a:p>
+          <a:p>
+            <a:r>
+              <a:rPr lang="en-US" baseline="0" dirty="0" smtClean="0"/>
+              <a:t>The majority of the states had less than 10 breweries in their state.</a:t>
+            </a:r>
+            <a:endParaRPr lang="en-US" dirty="0"/>
+          </a:p>
+        </p:txBody>
+      </p:sp>
+      <p:sp>
+        <p:nvSpPr>
+          <p:cNvPr id="4" name="Slide Number Placeholder 3"/>
+          <p:cNvSpPr>
+            <a:spLocks noGrp="1"/>
+          </p:cNvSpPr>
+          <p:nvPr>
+            <p:ph type="sldNum" sz="quarter" idx="10"/>
+          </p:nvPr>
+        </p:nvSpPr>
+        <p:spPr/>
+        <p:txBody>
+          <a:bodyPr/>
+          <a:lstStyle/>
+          <a:p>
+            <a:fld id="{1CD20D18-C2BB-4D17-BF0D-F161849BA92D}" type="slidenum">
+              <a:rPr lang="en-US" smtClean="0"/>
+              <a:t>4</a:t>
+            </a:fld>
+            <a:endParaRPr lang="en-US"/>
+          </a:p>
+        </p:txBody>
+      </p:sp>
+    </p:spTree>
+    <p:extLst>
+      <p:ext uri="{BB962C8B-B14F-4D97-AF65-F5344CB8AC3E}">
+        <p14:creationId xmlns:p14="http://schemas.microsoft.com/office/powerpoint/2010/main" val="1295797967"/>
+      </p:ext>
+    </p:extLst>
+  </p:cSld>
+  <p:clrMapOvr>
+    <a:masterClrMapping/>
+  </p:clrMapOvr>
+</p:notes>
+</file>
+
+<file path=ppt/notesSlides/notesSlide5.xml><?xml version="1.0" encoding="utf-8"?>
+<p:notes xmlns:a="http://schemas.openxmlformats.org/drawingml/2006/main" xmlns:r="http://schemas.openxmlformats.org/officeDocument/2006/relationships" xmlns:p="http://schemas.openxmlformats.org/presentationml/2006/main">
+  <p:cSld>
+    <p:spTree>
+      <p:nvGrpSpPr>
+        <p:cNvPr id="1" name=""/>
+        <p:cNvGrpSpPr/>
+        <p:nvPr/>
+      </p:nvGrpSpPr>
+      <p:grpSpPr>
+        <a:xfrm>
+          <a:off x="0" y="0"/>
+          <a:ext cx="0" cy="0"/>
+          <a:chOff x="0" y="0"/>
+          <a:chExt cx="0" cy="0"/>
+        </a:xfrm>
+      </p:grpSpPr>
+      <p:sp>
+        <p:nvSpPr>
+          <p:cNvPr id="2" name="Slide Image Placeholder 1"/>
+          <p:cNvSpPr>
+            <a:spLocks noGrp="1" noRot="1" noChangeAspect="1"/>
+          </p:cNvSpPr>
+          <p:nvPr>
+            <p:ph type="sldImg"/>
+          </p:nvPr>
+        </p:nvSpPr>
+        <p:spPr/>
+      </p:sp>
+      <p:sp>
+        <p:nvSpPr>
+          <p:cNvPr id="3" name="Notes Placeholder 2"/>
+          <p:cNvSpPr>
+            <a:spLocks noGrp="1"/>
+          </p:cNvSpPr>
+          <p:nvPr>
+            <p:ph type="body" idx="1"/>
+          </p:nvPr>
+        </p:nvSpPr>
+        <p:spPr/>
+        <p:txBody>
+          <a:bodyPr/>
+          <a:lstStyle/>
+          <a:p>
+            <a:r>
+              <a:rPr lang="en-US" dirty="0" smtClean="0"/>
+              <a:t>To better</a:t>
+            </a:r>
+            <a:r>
+              <a:rPr lang="en-US" baseline="0" dirty="0" smtClean="0"/>
+              <a:t> understand the relationships between the breweries and their products, we merged the separate lists beers and breweries</a:t>
+            </a:r>
+            <a:endParaRPr lang="en-US" dirty="0"/>
+          </a:p>
+        </p:txBody>
+      </p:sp>
+      <p:sp>
+        <p:nvSpPr>
+          <p:cNvPr id="4" name="Slide Number Placeholder 3"/>
+          <p:cNvSpPr>
+            <a:spLocks noGrp="1"/>
+          </p:cNvSpPr>
+          <p:nvPr>
+            <p:ph type="sldNum" sz="quarter" idx="10"/>
+          </p:nvPr>
+        </p:nvSpPr>
+        <p:spPr/>
+        <p:txBody>
+          <a:bodyPr/>
+          <a:lstStyle/>
+          <a:p>
+            <a:fld id="{1CD20D18-C2BB-4D17-BF0D-F161849BA92D}" type="slidenum">
+              <a:rPr lang="en-US" smtClean="0"/>
+              <a:t>5</a:t>
+            </a:fld>
+            <a:endParaRPr lang="en-US"/>
+          </a:p>
+        </p:txBody>
+      </p:sp>
+    </p:spTree>
+    <p:extLst>
+      <p:ext uri="{BB962C8B-B14F-4D97-AF65-F5344CB8AC3E}">
+        <p14:creationId xmlns:p14="http://schemas.microsoft.com/office/powerpoint/2010/main" val="2835591966"/>
+      </p:ext>
+    </p:extLst>
+  </p:cSld>
+  <p:clrMapOvr>
+    <a:masterClrMapping/>
+  </p:clrMapOvr>
+</p:notes>
+</file>
+
+<file path=ppt/notesSlides/notesSlide6.xml><?xml version="1.0" encoding="utf-8"?>
+<p:notes xmlns:a="http://schemas.openxmlformats.org/drawingml/2006/main" xmlns:r="http://schemas.openxmlformats.org/officeDocument/2006/relationships" xmlns:p="http://schemas.openxmlformats.org/presentationml/2006/main">
+  <p:cSld>
+    <p:spTree>
+      <p:nvGrpSpPr>
+        <p:cNvPr id="1" name=""/>
+        <p:cNvGrpSpPr/>
+        <p:nvPr/>
+      </p:nvGrpSpPr>
+      <p:grpSpPr>
+        <a:xfrm>
+          <a:off x="0" y="0"/>
+          <a:ext cx="0" cy="0"/>
+          <a:chOff x="0" y="0"/>
+          <a:chExt cx="0" cy="0"/>
+        </a:xfrm>
+      </p:grpSpPr>
+      <p:sp>
+        <p:nvSpPr>
+          <p:cNvPr id="2" name="Slide Image Placeholder 1"/>
+          <p:cNvSpPr>
+            <a:spLocks noGrp="1" noRot="1" noChangeAspect="1"/>
+          </p:cNvSpPr>
+          <p:nvPr>
+            <p:ph type="sldImg"/>
+          </p:nvPr>
+        </p:nvSpPr>
+        <p:spPr/>
+      </p:sp>
+      <p:sp>
+        <p:nvSpPr>
+          <p:cNvPr id="3" name="Notes Placeholder 2"/>
+          <p:cNvSpPr>
+            <a:spLocks noGrp="1"/>
+          </p:cNvSpPr>
+          <p:nvPr>
+            <p:ph type="body" idx="1"/>
+          </p:nvPr>
+        </p:nvSpPr>
+        <p:spPr/>
+        <p:txBody>
+          <a:bodyPr/>
+          <a:lstStyle/>
+          <a:p>
+            <a:r>
+              <a:rPr lang="en-US" dirty="0" smtClean="0"/>
+              <a:t>To determine</a:t>
+            </a:r>
+            <a:r>
+              <a:rPr lang="en-US" baseline="0" dirty="0" smtClean="0"/>
+              <a:t> whether available values were significant in our analysis, we quantified the available missing data</a:t>
+            </a:r>
+          </a:p>
+          <a:p>
+            <a:r>
+              <a:rPr lang="en-US" baseline="0" dirty="0" smtClean="0"/>
+              <a:t>Although a little less than half the beers had missing IBU values, we still felt the remaining values are an indicative trait in the beers being produced </a:t>
+            </a:r>
+            <a:endParaRPr lang="en-US" dirty="0"/>
+          </a:p>
+        </p:txBody>
+      </p:sp>
+      <p:sp>
+        <p:nvSpPr>
+          <p:cNvPr id="4" name="Slide Number Placeholder 3"/>
+          <p:cNvSpPr>
+            <a:spLocks noGrp="1"/>
+          </p:cNvSpPr>
+          <p:nvPr>
+            <p:ph type="sldNum" sz="quarter" idx="10"/>
+          </p:nvPr>
+        </p:nvSpPr>
+        <p:spPr/>
+        <p:txBody>
+          <a:bodyPr/>
+          <a:lstStyle/>
+          <a:p>
+            <a:fld id="{1CD20D18-C2BB-4D17-BF0D-F161849BA92D}" type="slidenum">
+              <a:rPr lang="en-US" smtClean="0"/>
+              <a:t>6</a:t>
+            </a:fld>
+            <a:endParaRPr lang="en-US"/>
+          </a:p>
+        </p:txBody>
+      </p:sp>
+    </p:spTree>
+    <p:extLst>
+      <p:ext uri="{BB962C8B-B14F-4D97-AF65-F5344CB8AC3E}">
+        <p14:creationId xmlns:p14="http://schemas.microsoft.com/office/powerpoint/2010/main" val="3343718682"/>
+      </p:ext>
+    </p:extLst>
+  </p:cSld>
+  <p:clrMapOvr>
+    <a:masterClrMapping/>
+  </p:clrMapOvr>
+</p:notes>
+</file>
+
+<file path=ppt/notesSlides/notesSlide7.xml><?xml version="1.0" encoding="utf-8"?>
+<p:notes xmlns:a="http://schemas.openxmlformats.org/drawingml/2006/main" xmlns:r="http://schemas.openxmlformats.org/officeDocument/2006/relationships" xmlns:p="http://schemas.openxmlformats.org/presentationml/2006/main">
+  <p:cSld>
+    <p:spTree>
+      <p:nvGrpSpPr>
+        <p:cNvPr id="1" name=""/>
+        <p:cNvGrpSpPr/>
+        <p:nvPr/>
+      </p:nvGrpSpPr>
+      <p:grpSpPr>
+        <a:xfrm>
+          <a:off x="0" y="0"/>
+          <a:ext cx="0" cy="0"/>
+          <a:chOff x="0" y="0"/>
+          <a:chExt cx="0" cy="0"/>
+        </a:xfrm>
+      </p:grpSpPr>
+      <p:sp>
+        <p:nvSpPr>
+          <p:cNvPr id="2" name="Slide Image Placeholder 1"/>
+          <p:cNvSpPr>
+            <a:spLocks noGrp="1" noRot="1" noChangeAspect="1"/>
+          </p:cNvSpPr>
+          <p:nvPr>
+            <p:ph type="sldImg"/>
+          </p:nvPr>
+        </p:nvSpPr>
+        <p:spPr/>
+      </p:sp>
+      <p:sp>
+        <p:nvSpPr>
+          <p:cNvPr id="3" name="Notes Placeholder 2"/>
+          <p:cNvSpPr>
+            <a:spLocks noGrp="1"/>
+          </p:cNvSpPr>
+          <p:nvPr>
+            <p:ph type="body" idx="1"/>
+          </p:nvPr>
+        </p:nvSpPr>
+        <p:spPr/>
+        <p:txBody>
+          <a:bodyPr/>
+          <a:lstStyle/>
+          <a:p>
+            <a:r>
+              <a:rPr lang="en-US" dirty="0" smtClean="0"/>
+              <a:t>So,</a:t>
+            </a:r>
+            <a:r>
+              <a:rPr lang="en-US" baseline="0" dirty="0" smtClean="0"/>
+              <a:t> we graphed the median Alcohol by Volume and International Bitterness Units of beers in each state</a:t>
+            </a:r>
+          </a:p>
+          <a:p>
+            <a:r>
+              <a:rPr lang="en-US" baseline="0" dirty="0" smtClean="0"/>
+              <a:t>In the left graph, it appears that the majority of the median ABV across states are between 5% to 6.25%</a:t>
+            </a:r>
+          </a:p>
+          <a:p>
+            <a:r>
+              <a:rPr lang="en-US" baseline="0" dirty="0" smtClean="0"/>
+              <a:t>Whereas the majority of the median IBU across states is 35 or less.</a:t>
+            </a:r>
+            <a:endParaRPr lang="en-US" dirty="0"/>
+          </a:p>
+        </p:txBody>
+      </p:sp>
+      <p:sp>
+        <p:nvSpPr>
+          <p:cNvPr id="4" name="Slide Number Placeholder 3"/>
+          <p:cNvSpPr>
+            <a:spLocks noGrp="1"/>
+          </p:cNvSpPr>
+          <p:nvPr>
+            <p:ph type="sldNum" sz="quarter" idx="10"/>
+          </p:nvPr>
+        </p:nvSpPr>
+        <p:spPr/>
+        <p:txBody>
+          <a:bodyPr/>
+          <a:lstStyle/>
+          <a:p>
+            <a:fld id="{1CD20D18-C2BB-4D17-BF0D-F161849BA92D}" type="slidenum">
+              <a:rPr lang="en-US" smtClean="0"/>
+              <a:t>7</a:t>
+            </a:fld>
+            <a:endParaRPr lang="en-US"/>
+          </a:p>
+        </p:txBody>
+      </p:sp>
+    </p:spTree>
+    <p:extLst>
+      <p:ext uri="{BB962C8B-B14F-4D97-AF65-F5344CB8AC3E}">
+        <p14:creationId xmlns:p14="http://schemas.microsoft.com/office/powerpoint/2010/main" val="2927476250"/>
+      </p:ext>
+    </p:extLst>
+  </p:cSld>
+  <p:clrMapOvr>
+    <a:masterClrMapping/>
+  </p:clrMapOvr>
+</p:notes>
+</file>
+
+<file path=ppt/notesSlides/notesSlide8.xml><?xml version="1.0" encoding="utf-8"?>
+<p:notes xmlns:a="http://schemas.openxmlformats.org/drawingml/2006/main" xmlns:r="http://schemas.openxmlformats.org/officeDocument/2006/relationships" xmlns:p="http://schemas.openxmlformats.org/presentationml/2006/main">
+  <p:cSld>
+    <p:spTree>
+      <p:nvGrpSpPr>
+        <p:cNvPr id="1" name=""/>
+        <p:cNvGrpSpPr/>
+        <p:nvPr/>
+      </p:nvGrpSpPr>
+      <p:grpSpPr>
+        <a:xfrm>
+          <a:off x="0" y="0"/>
+          <a:ext cx="0" cy="0"/>
+          <a:chOff x="0" y="0"/>
+          <a:chExt cx="0" cy="0"/>
+        </a:xfrm>
+      </p:grpSpPr>
+      <p:sp>
+        <p:nvSpPr>
+          <p:cNvPr id="2" name="Slide Image Placeholder 1"/>
+          <p:cNvSpPr>
+            <a:spLocks noGrp="1" noRot="1" noChangeAspect="1"/>
+          </p:cNvSpPr>
+          <p:nvPr>
+            <p:ph type="sldImg"/>
+          </p:nvPr>
+        </p:nvSpPr>
+        <p:spPr/>
+      </p:sp>
+      <p:sp>
+        <p:nvSpPr>
+          <p:cNvPr id="3" name="Notes Placeholder 2"/>
+          <p:cNvSpPr>
+            <a:spLocks noGrp="1"/>
+          </p:cNvSpPr>
+          <p:nvPr>
+            <p:ph type="body" idx="1"/>
+          </p:nvPr>
+        </p:nvSpPr>
+        <p:spPr/>
+        <p:txBody>
+          <a:bodyPr/>
+          <a:lstStyle/>
+          <a:p>
+            <a:r>
+              <a:rPr lang="en-US" dirty="0" smtClean="0"/>
+              <a:t>I’m sure it’s no surprise to you that CO has the state with highest</a:t>
+            </a:r>
+            <a:r>
+              <a:rPr lang="en-US" baseline="0" dirty="0" smtClean="0"/>
+              <a:t> ABV</a:t>
+            </a:r>
+          </a:p>
+          <a:p>
+            <a:r>
+              <a:rPr lang="en-US" baseline="0" dirty="0" smtClean="0"/>
+              <a:t>But what did come as a surprise is that OR was the state with the highest OR</a:t>
+            </a:r>
+          </a:p>
+          <a:p>
+            <a:r>
+              <a:rPr lang="en-US" baseline="0" dirty="0" smtClean="0"/>
+              <a:t>It must be the weather</a:t>
+            </a:r>
+            <a:endParaRPr lang="en-US" dirty="0"/>
+          </a:p>
+        </p:txBody>
+      </p:sp>
+      <p:sp>
+        <p:nvSpPr>
+          <p:cNvPr id="4" name="Slide Number Placeholder 3"/>
+          <p:cNvSpPr>
+            <a:spLocks noGrp="1"/>
+          </p:cNvSpPr>
+          <p:nvPr>
+            <p:ph type="sldNum" sz="quarter" idx="10"/>
+          </p:nvPr>
+        </p:nvSpPr>
+        <p:spPr/>
+        <p:txBody>
+          <a:bodyPr/>
+          <a:lstStyle/>
+          <a:p>
+            <a:fld id="{1CD20D18-C2BB-4D17-BF0D-F161849BA92D}" type="slidenum">
+              <a:rPr lang="en-US" smtClean="0"/>
+              <a:t>8</a:t>
+            </a:fld>
+            <a:endParaRPr lang="en-US"/>
+          </a:p>
+        </p:txBody>
+      </p:sp>
+    </p:spTree>
+    <p:extLst>
+      <p:ext uri="{BB962C8B-B14F-4D97-AF65-F5344CB8AC3E}">
+        <p14:creationId xmlns:p14="http://schemas.microsoft.com/office/powerpoint/2010/main" val="591936682"/>
+      </p:ext>
+    </p:extLst>
+  </p:cSld>
+  <p:clrMapOvr>
+    <a:masterClrMapping/>
+  </p:clrMapOvr>
+</p:notes>
+</file>
+
+<file path=ppt/notesSlides/notesSlide9.xml><?xml version="1.0" encoding="utf-8"?>
+<p:notes xmlns:a="http://schemas.openxmlformats.org/drawingml/2006/main" xmlns:r="http://schemas.openxmlformats.org/officeDocument/2006/relationships" xmlns:p="http://schemas.openxmlformats.org/presentationml/2006/main">
+  <p:cSld>
+    <p:spTree>
+      <p:nvGrpSpPr>
+        <p:cNvPr id="1" name=""/>
+        <p:cNvGrpSpPr/>
+        <p:nvPr/>
+      </p:nvGrpSpPr>
+      <p:grpSpPr>
+        <a:xfrm>
+          <a:off x="0" y="0"/>
+          <a:ext cx="0" cy="0"/>
+          <a:chOff x="0" y="0"/>
+          <a:chExt cx="0" cy="0"/>
+        </a:xfrm>
+      </p:grpSpPr>
+      <p:sp>
+        <p:nvSpPr>
+          <p:cNvPr id="2" name="Slide Image Placeholder 1"/>
+          <p:cNvSpPr>
+            <a:spLocks noGrp="1" noRot="1" noChangeAspect="1"/>
+          </p:cNvSpPr>
+          <p:nvPr>
+            <p:ph type="sldImg"/>
+          </p:nvPr>
+        </p:nvSpPr>
+        <p:spPr/>
+      </p:sp>
+      <p:sp>
+        <p:nvSpPr>
+          <p:cNvPr id="3" name="Notes Placeholder 2"/>
+          <p:cNvSpPr>
+            <a:spLocks noGrp="1"/>
+          </p:cNvSpPr>
+          <p:nvPr>
+            <p:ph type="body" idx="1"/>
+          </p:nvPr>
+        </p:nvSpPr>
+        <p:spPr/>
+        <p:txBody>
+          <a:bodyPr/>
+          <a:lstStyle/>
+          <a:p>
+            <a:r>
+              <a:rPr lang="en-US" dirty="0" smtClean="0"/>
+              <a:t>With almost</a:t>
+            </a:r>
+            <a:r>
+              <a:rPr lang="en-US" baseline="0" dirty="0" smtClean="0"/>
+              <a:t> 98% availability of  the ABV values in the data, we identified…</a:t>
+            </a:r>
+          </a:p>
+        </p:txBody>
+      </p:sp>
+      <p:sp>
+        <p:nvSpPr>
+          <p:cNvPr id="4" name="Slide Number Placeholder 3"/>
+          <p:cNvSpPr>
+            <a:spLocks noGrp="1"/>
+          </p:cNvSpPr>
+          <p:nvPr>
+            <p:ph type="sldNum" sz="quarter" idx="10"/>
+          </p:nvPr>
+        </p:nvSpPr>
+        <p:spPr/>
+        <p:txBody>
+          <a:bodyPr/>
+          <a:lstStyle/>
+          <a:p>
+            <a:fld id="{1CD20D18-C2BB-4D17-BF0D-F161849BA92D}" type="slidenum">
+              <a:rPr lang="en-US" smtClean="0"/>
+              <a:t>9</a:t>
+            </a:fld>
+            <a:endParaRPr lang="en-US"/>
+          </a:p>
+        </p:txBody>
+      </p:sp>
+    </p:spTree>
+    <p:extLst>
+      <p:ext uri="{BB962C8B-B14F-4D97-AF65-F5344CB8AC3E}">
+        <p14:creationId xmlns:p14="http://schemas.microsoft.com/office/powerpoint/2010/main" val="940864803"/>
       </p:ext>
     </p:extLst>
   </p:cSld>
@@ -4640,7 +5513,6 @@
               <a:rPr lang="en-US" dirty="0" smtClean="0"/>
               <a:t>--- </a:t>
             </a:r>
-            <a:endParaRPr lang="en-US" dirty="0" smtClean="0"/>
           </a:p>
           <a:p>
             <a:pPr lvl="1">
@@ -4667,11 +5539,7 @@
             </a:pPr>
             <a:r>
               <a:rPr lang="en-US" dirty="0" smtClean="0"/>
-              <a:t>With</a:t>
-            </a:r>
-            <a:r>
-              <a:rPr lang="en-US" dirty="0" smtClean="0"/>
-              <a:t> </a:t>
+              <a:t>With </a:t>
             </a:r>
             <a:r>
               <a:rPr lang="en-US" dirty="0"/>
@@ -4681,7 +5549,6 @@
               <a:rPr lang="en-US" dirty="0" smtClean="0"/>
               <a:t>--- </a:t>
             </a:r>
-            <a:endParaRPr lang="en-US" dirty="0" smtClean="0"/>
           </a:p>
           <a:p>
             <a:pPr lvl="1">
@@ -4708,7 +5575,6 @@
               <a:rPr lang="en-US" dirty="0" smtClean="0"/>
               <a:t>]</a:t>
             </a:r>
-            <a:endParaRPr lang="en-US" dirty="0" smtClean="0"/>
           </a:p>
           <a:p>
             <a:pPr>
@@ -4717,11 +5583,7 @@
             </a:pPr>
             <a:r>
               <a:rPr lang="en-US" dirty="0" smtClean="0"/>
-              <a:t>With </a:t>
-            </a:r>
-            <a:r>
-              <a:rPr lang="en-US" dirty="0" smtClean="0"/>
-              <a:t>the </a:t>
+              <a:t>With the </a:t>
             </a:r>
             <a:r>
               <a:rPr lang="en-US" dirty="0"/>
@@ -4731,7 +5593,6 @@
               <a:rPr lang="en-US" dirty="0" smtClean="0"/>
               <a:t>--- </a:t>
             </a:r>
-            <a:endParaRPr lang="en-US" dirty="0" smtClean="0"/>
           </a:p>
           <a:p>
             <a:pPr lvl="1">
@@ -4748,11 +5609,7 @@
             </a:r>
             <a:r>
               <a:rPr lang="en-US" dirty="0" smtClean="0"/>
-              <a:t>52</a:t>
-            </a:r>
-            <a:r>
-              <a:rPr lang="en-US" dirty="0" smtClean="0"/>
-              <a:t>]</a:t>
+              <a:t>52]</a:t>
             </a:r>
             <a:endParaRPr lang="en-US" dirty="0"/>
           </a:p>
@@ -5137,7 +5994,7 @@
           <p:nvPr/>
         </p:nvPicPr>
         <p:blipFill>
-          <a:blip r:embed="rId2"/>
+          <a:blip r:embed="rId3"/>
           <a:stretch>
             <a:fillRect/>
           </a:stretch>
@@ -5215,7 +6072,7 @@
           </p:nvPr>
         </p:nvPicPr>
         <p:blipFill>
-          <a:blip r:embed="rId2"/>
+          <a:blip r:embed="rId3"/>
           <a:stretch>
             <a:fillRect/>
           </a:stretch>
@@ -5239,7 +6096,7 @@
           <p:nvPr/>
         </p:nvPicPr>
         <p:blipFill>
-          <a:blip r:embed="rId3"/>
+          <a:blip r:embed="rId4"/>
           <a:stretch>
             <a:fillRect/>
           </a:stretch>
@@ -5378,7 +6235,7 @@
           </p:nvPr>
         </p:nvPicPr>
         <p:blipFill>
-          <a:blip r:embed="rId2"/>
+          <a:blip r:embed="rId3"/>
           <a:stretch>
             <a:fillRect/>
           </a:stretch>
@@ -5402,7 +6259,7 @@
           <p:nvPr/>
         </p:nvPicPr>
         <p:blipFill>
-          <a:blip r:embed="rId3"/>
+          <a:blip r:embed="rId4"/>
           <a:stretch>
             <a:fillRect/>
           </a:stretch>
@@ -5558,7 +6415,7 @@
           </p:nvPr>
         </p:nvPicPr>
         <p:blipFill>
-          <a:blip r:embed="rId2"/>
+          <a:blip r:embed="rId3"/>
           <a:stretch>
             <a:fillRect/>
           </a:stretch>
@@ -5604,7 +6461,7 @@
           <p:nvPr/>
         </p:nvPicPr>
         <p:blipFill>
-          <a:blip r:embed="rId3"/>
+          <a:blip r:embed="rId4"/>
           <a:stretch>
             <a:fillRect/>
           </a:stretch>
@@ -5695,7 +6552,7 @@
           </p:nvPr>
         </p:nvPicPr>
         <p:blipFill>
-          <a:blip r:embed="rId2"/>
+          <a:blip r:embed="rId3"/>
           <a:stretch>
             <a:fillRect/>
           </a:stretch>
@@ -5719,7 +6576,7 @@
           <p:nvPr/>
         </p:nvPicPr>
         <p:blipFill>
-          <a:blip r:embed="rId3"/>
+          <a:blip r:embed="rId4"/>
           <a:stretch>
             <a:fillRect/>
           </a:stretch>
@@ -5798,7 +6655,7 @@
           </p:nvPr>
         </p:nvPicPr>
         <p:blipFill>
-          <a:blip r:embed="rId2"/>
+          <a:blip r:embed="rId3"/>
           <a:stretch>
             <a:fillRect/>
           </a:stretch>
@@ -5822,7 +6679,7 @@
           <p:nvPr/>
         </p:nvPicPr>
         <p:blipFill>
-          <a:blip r:embed="rId3"/>
+          <a:blip r:embed="rId4"/>
           <a:stretch>
             <a:fillRect/>
           </a:stretch>
@@ -5845,8 +6702,8 @@
         </p:nvSpPr>
         <p:spPr>
           <a:xfrm>
-            <a:off x="710214" y="3187084"/>
-            <a:ext cx="6116714" cy="923330"/>
+            <a:off x="581192" y="2440324"/>
+            <a:ext cx="6444448" cy="1477328"/>
           </a:xfrm>
           <a:prstGeom prst="rect">
             <a:avLst/>
@@ -5860,11 +6717,28 @@
           <a:lstStyle/>
           <a:p>
             <a:r>
-              <a:rPr lang="en-US" dirty="0"/>
-              <a:t>50% of the beers have an ABV between 5% and 6.7% with the minimum and maximum being 0.1% and 12.8%.</a:t>
-            </a:r>
-          </a:p>
-          <a:p>
+              <a:rPr lang="en-US" dirty="0" smtClean="0"/>
+              <a:t>Delaware has a beer with a minimum ABV of 0.1%</a:t>
+            </a:r>
+          </a:p>
+          <a:p>
+            <a:endParaRPr lang="en-US" dirty="0"/>
+          </a:p>
+          <a:p>
+            <a:r>
+              <a:rPr lang="en-US" dirty="0" smtClean="0"/>
+              <a:t>The mean ABV across all the beers was almost 6%.</a:t>
+            </a:r>
+            <a:endParaRPr lang="en-US" dirty="0"/>
+          </a:p>
+          <a:p>
+            <a:endParaRPr lang="en-US" dirty="0" smtClean="0"/>
+          </a:p>
+          <a:p>
+            <a:r>
+              <a:rPr lang="en-US" dirty="0" smtClean="0"/>
+              <a:t>75% of the beers have an ABV greater than or equal to 6.7%</a:t>
+            </a:r>
             <a:endParaRPr lang="en-US" dirty="0"/>
           </a:p>
         </p:txBody>

</xml_diff>